<commit_message>
[v.1.2.2] update launcher and slave
</commit_message>
<xml_diff>
--- a/190717_LabgeniusPCR_Protocol.pptx
+++ b/190717_LabgeniusPCR_Protocol.pptx
@@ -261,7 +261,7 @@
           <a:p>
             <a:fld id="{4ED526AE-A907-4D3D-B860-9A173727D03B}" type="datetimeFigureOut">
               <a:rPr lang="ko-KR" altLang="en-US" smtClean="0"/>
-              <a:t>2019-07-17</a:t>
+              <a:t>2019-08-14</a:t>
             </a:fld>
             <a:endParaRPr lang="ko-KR" altLang="en-US"/>
           </a:p>
@@ -459,7 +459,7 @@
           <a:p>
             <a:fld id="{4ED526AE-A907-4D3D-B860-9A173727D03B}" type="datetimeFigureOut">
               <a:rPr lang="ko-KR" altLang="en-US" smtClean="0"/>
-              <a:t>2019-07-17</a:t>
+              <a:t>2019-08-14</a:t>
             </a:fld>
             <a:endParaRPr lang="ko-KR" altLang="en-US"/>
           </a:p>
@@ -667,7 +667,7 @@
           <a:p>
             <a:fld id="{4ED526AE-A907-4D3D-B860-9A173727D03B}" type="datetimeFigureOut">
               <a:rPr lang="ko-KR" altLang="en-US" smtClean="0"/>
-              <a:t>2019-07-17</a:t>
+              <a:t>2019-08-14</a:t>
             </a:fld>
             <a:endParaRPr lang="ko-KR" altLang="en-US"/>
           </a:p>
@@ -865,7 +865,7 @@
           <a:p>
             <a:fld id="{4ED526AE-A907-4D3D-B860-9A173727D03B}" type="datetimeFigureOut">
               <a:rPr lang="ko-KR" altLang="en-US" smtClean="0"/>
-              <a:t>2019-07-17</a:t>
+              <a:t>2019-08-14</a:t>
             </a:fld>
             <a:endParaRPr lang="ko-KR" altLang="en-US"/>
           </a:p>
@@ -1140,7 +1140,7 @@
           <a:p>
             <a:fld id="{4ED526AE-A907-4D3D-B860-9A173727D03B}" type="datetimeFigureOut">
               <a:rPr lang="ko-KR" altLang="en-US" smtClean="0"/>
-              <a:t>2019-07-17</a:t>
+              <a:t>2019-08-14</a:t>
             </a:fld>
             <a:endParaRPr lang="ko-KR" altLang="en-US"/>
           </a:p>
@@ -1405,7 +1405,7 @@
           <a:p>
             <a:fld id="{4ED526AE-A907-4D3D-B860-9A173727D03B}" type="datetimeFigureOut">
               <a:rPr lang="ko-KR" altLang="en-US" smtClean="0"/>
-              <a:t>2019-07-17</a:t>
+              <a:t>2019-08-14</a:t>
             </a:fld>
             <a:endParaRPr lang="ko-KR" altLang="en-US"/>
           </a:p>
@@ -1817,7 +1817,7 @@
           <a:p>
             <a:fld id="{4ED526AE-A907-4D3D-B860-9A173727D03B}" type="datetimeFigureOut">
               <a:rPr lang="ko-KR" altLang="en-US" smtClean="0"/>
-              <a:t>2019-07-17</a:t>
+              <a:t>2019-08-14</a:t>
             </a:fld>
             <a:endParaRPr lang="ko-KR" altLang="en-US"/>
           </a:p>
@@ -1958,7 +1958,7 @@
           <a:p>
             <a:fld id="{4ED526AE-A907-4D3D-B860-9A173727D03B}" type="datetimeFigureOut">
               <a:rPr lang="ko-KR" altLang="en-US" smtClean="0"/>
-              <a:t>2019-07-17</a:t>
+              <a:t>2019-08-14</a:t>
             </a:fld>
             <a:endParaRPr lang="ko-KR" altLang="en-US"/>
           </a:p>
@@ -2071,7 +2071,7 @@
           <a:p>
             <a:fld id="{4ED526AE-A907-4D3D-B860-9A173727D03B}" type="datetimeFigureOut">
               <a:rPr lang="ko-KR" altLang="en-US" smtClean="0"/>
-              <a:t>2019-07-17</a:t>
+              <a:t>2019-08-14</a:t>
             </a:fld>
             <a:endParaRPr lang="ko-KR" altLang="en-US"/>
           </a:p>
@@ -2382,7 +2382,7 @@
           <a:p>
             <a:fld id="{4ED526AE-A907-4D3D-B860-9A173727D03B}" type="datetimeFigureOut">
               <a:rPr lang="ko-KR" altLang="en-US" smtClean="0"/>
-              <a:t>2019-07-17</a:t>
+              <a:t>2019-08-14</a:t>
             </a:fld>
             <a:endParaRPr lang="ko-KR" altLang="en-US"/>
           </a:p>
@@ -2670,7 +2670,7 @@
           <a:p>
             <a:fld id="{4ED526AE-A907-4D3D-B860-9A173727D03B}" type="datetimeFigureOut">
               <a:rPr lang="ko-KR" altLang="en-US" smtClean="0"/>
-              <a:t>2019-07-17</a:t>
+              <a:t>2019-08-14</a:t>
             </a:fld>
             <a:endParaRPr lang="ko-KR" altLang="en-US"/>
           </a:p>
@@ -2911,7 +2911,7 @@
           <a:p>
             <a:fld id="{4ED526AE-A907-4D3D-B860-9A173727D03B}" type="datetimeFigureOut">
               <a:rPr lang="ko-KR" altLang="en-US" smtClean="0"/>
-              <a:t>2019-07-17</a:t>
+              <a:t>2019-08-14</a:t>
             </a:fld>
             <a:endParaRPr lang="ko-KR" altLang="en-US"/>
           </a:p>
@@ -3355,7 +3355,7 @@
             </a:r>
             <a:r>
               <a:rPr lang="en-US" altLang="ko-KR" dirty="0"/>
-              <a:t> PCR Protocol</a:t>
+              <a:t> PCR</a:t>
             </a:r>
             <a:endParaRPr lang="ko-KR" altLang="en-US" dirty="0"/>
           </a:p>
@@ -6182,8 +6182,8 @@
         </p:nvSpPr>
         <p:spPr>
           <a:xfrm>
-            <a:off x="1386016" y="3367917"/>
-            <a:ext cx="300082" cy="369332"/>
+            <a:off x="1243403" y="3367917"/>
+            <a:ext cx="574196" cy="369332"/>
           </a:xfrm>
           <a:prstGeom prst="rect">
             <a:avLst/>
@@ -6198,7 +6198,7 @@
           <a:p>
             <a:r>
               <a:rPr lang="en-US" altLang="ko-KR" dirty="0"/>
-              <a:t>F</a:t>
+              <a:t>R, F</a:t>
             </a:r>
             <a:endParaRPr lang="ko-KR" altLang="en-US" dirty="0"/>
           </a:p>
@@ -6566,6 +6566,88 @@
             <a:r>
               <a:rPr lang="en-US" altLang="ko-KR" dirty="0"/>
               <a:t>C, S commands always available</a:t>
+            </a:r>
+            <a:endParaRPr lang="ko-KR" altLang="en-US" dirty="0"/>
+          </a:p>
+        </p:txBody>
+      </p:sp>
+      <p:cxnSp>
+        <p:nvCxnSpPr>
+          <p:cNvPr id="5" name="연결선: 구부러짐 4">
+            <a:extLst>
+              <a:ext uri="{FF2B5EF4-FFF2-40B4-BE49-F238E27FC236}">
+                <a16:creationId xmlns:a16="http://schemas.microsoft.com/office/drawing/2014/main" id="{9F0AC2F1-12A8-45C5-8FDF-2D8D39952803}"/>
+              </a:ext>
+            </a:extLst>
+          </p:cNvPr>
+          <p:cNvCxnSpPr>
+            <a:cxnSpLocks/>
+            <a:stCxn id="3" idx="2"/>
+            <a:endCxn id="3" idx="1"/>
+          </p:cNvCxnSpPr>
+          <p:nvPr/>
+        </p:nvCxnSpPr>
+        <p:spPr>
+          <a:xfrm rot="10800000" flipH="1">
+            <a:off x="1090567" y="2156231"/>
+            <a:ext cx="218373" cy="527199"/>
+          </a:xfrm>
+          <a:prstGeom prst="curvedConnector4">
+            <a:avLst>
+              <a:gd name="adj1" fmla="val -104683"/>
+              <a:gd name="adj2" fmla="val 184783"/>
+            </a:avLst>
+          </a:prstGeom>
+          <a:ln>
+            <a:tailEnd type="triangle"/>
+          </a:ln>
+        </p:spPr>
+        <p:style>
+          <a:lnRef idx="1">
+            <a:schemeClr val="accent1"/>
+          </a:lnRef>
+          <a:fillRef idx="0">
+            <a:schemeClr val="accent1"/>
+          </a:fillRef>
+          <a:effectRef idx="0">
+            <a:schemeClr val="accent1"/>
+          </a:effectRef>
+          <a:fontRef idx="minor">
+            <a:schemeClr val="tx1"/>
+          </a:fontRef>
+        </p:style>
+      </p:cxnSp>
+      <p:sp>
+        <p:nvSpPr>
+          <p:cNvPr id="32" name="TextBox 31">
+            <a:extLst>
+              <a:ext uri="{FF2B5EF4-FFF2-40B4-BE49-F238E27FC236}">
+                <a16:creationId xmlns:a16="http://schemas.microsoft.com/office/drawing/2014/main" id="{1BEA101E-F889-4557-8130-58B4B5B56326}"/>
+              </a:ext>
+            </a:extLst>
+          </p:cNvPr>
+          <p:cNvSpPr txBox="1"/>
+          <p:nvPr/>
+        </p:nvSpPr>
+        <p:spPr>
+          <a:xfrm>
+            <a:off x="579400" y="1737151"/>
+            <a:ext cx="325730" cy="369332"/>
+          </a:xfrm>
+          <a:prstGeom prst="rect">
+            <a:avLst/>
+          </a:prstGeom>
+          <a:noFill/>
+        </p:spPr>
+        <p:txBody>
+          <a:bodyPr wrap="none" rtlCol="0">
+            <a:spAutoFit/>
+          </a:bodyPr>
+          <a:lstStyle/>
+          <a:p>
+            <a:r>
+              <a:rPr lang="en-US" altLang="ko-KR" dirty="0"/>
+              <a:t>R</a:t>
             </a:r>
             <a:endParaRPr lang="ko-KR" altLang="en-US" dirty="0"/>
           </a:p>

</xml_diff>